<commit_message>
updated powerpoint with more quantitative metrics
</commit_message>
<xml_diff>
--- a/BGG_EDA.pptx
+++ b/BGG_EDA.pptx
@@ -215,7 +215,7 @@
           <a:p>
             <a:fld id="{40069FFF-B304-4841-8E25-09209E831B91}" type="datetimeFigureOut">
               <a:rPr lang="en-CA" smtClean="0"/>
-              <a:t>2025-08-13</a:t>
+              <a:t>2025-08-18</a:t>
             </a:fld>
             <a:endParaRPr lang="en-CA"/>
           </a:p>
@@ -1169,7 +1169,7 @@
           <a:p>
             <a:fld id="{BB5B521A-FEE1-4C8F-9E4D-DF2ED1D6ACDC}" type="datetimeFigureOut">
               <a:rPr lang="en-CA" smtClean="0"/>
-              <a:t>2025-08-13</a:t>
+              <a:t>2025-08-18</a:t>
             </a:fld>
             <a:endParaRPr lang="en-CA"/>
           </a:p>
@@ -1339,7 +1339,7 @@
           <a:p>
             <a:fld id="{BB5B521A-FEE1-4C8F-9E4D-DF2ED1D6ACDC}" type="datetimeFigureOut">
               <a:rPr lang="en-CA" smtClean="0"/>
-              <a:t>2025-08-13</a:t>
+              <a:t>2025-08-18</a:t>
             </a:fld>
             <a:endParaRPr lang="en-CA"/>
           </a:p>
@@ -1560,7 +1560,7 @@
           <a:p>
             <a:fld id="{BB5B521A-FEE1-4C8F-9E4D-DF2ED1D6ACDC}" type="datetimeFigureOut">
               <a:rPr lang="en-CA" smtClean="0"/>
-              <a:t>2025-08-13</a:t>
+              <a:t>2025-08-18</a:t>
             </a:fld>
             <a:endParaRPr lang="en-CA"/>
           </a:p>
@@ -1771,7 +1771,7 @@
           <a:p>
             <a:fld id="{BB5B521A-FEE1-4C8F-9E4D-DF2ED1D6ACDC}" type="datetimeFigureOut">
               <a:rPr lang="en-CA" smtClean="0"/>
-              <a:t>2025-08-13</a:t>
+              <a:t>2025-08-18</a:t>
             </a:fld>
             <a:endParaRPr lang="en-CA"/>
           </a:p>
@@ -2066,7 +2066,7 @@
           <a:p>
             <a:fld id="{BB5B521A-FEE1-4C8F-9E4D-DF2ED1D6ACDC}" type="datetimeFigureOut">
               <a:rPr lang="en-CA" smtClean="0"/>
-              <a:t>2025-08-13</a:t>
+              <a:t>2025-08-18</a:t>
             </a:fld>
             <a:endParaRPr lang="en-CA"/>
           </a:p>
@@ -2395,7 +2395,7 @@
           <a:p>
             <a:fld id="{BB5B521A-FEE1-4C8F-9E4D-DF2ED1D6ACDC}" type="datetimeFigureOut">
               <a:rPr lang="en-CA" smtClean="0"/>
-              <a:t>2025-08-13</a:t>
+              <a:t>2025-08-18</a:t>
             </a:fld>
             <a:endParaRPr lang="en-CA"/>
           </a:p>
@@ -2887,7 +2887,7 @@
           <a:p>
             <a:fld id="{BB5B521A-FEE1-4C8F-9E4D-DF2ED1D6ACDC}" type="datetimeFigureOut">
               <a:rPr lang="en-CA" smtClean="0"/>
-              <a:t>2025-08-13</a:t>
+              <a:t>2025-08-18</a:t>
             </a:fld>
             <a:endParaRPr lang="en-CA"/>
           </a:p>
@@ -3046,7 +3046,7 @@
           <a:p>
             <a:fld id="{BB5B521A-FEE1-4C8F-9E4D-DF2ED1D6ACDC}" type="datetimeFigureOut">
               <a:rPr lang="en-CA" smtClean="0"/>
-              <a:t>2025-08-13</a:t>
+              <a:t>2025-08-18</a:t>
             </a:fld>
             <a:endParaRPr lang="en-CA"/>
           </a:p>
@@ -3182,7 +3182,7 @@
           <a:p>
             <a:fld id="{BB5B521A-FEE1-4C8F-9E4D-DF2ED1D6ACDC}" type="datetimeFigureOut">
               <a:rPr lang="en-CA" smtClean="0"/>
-              <a:t>2025-08-13</a:t>
+              <a:t>2025-08-18</a:t>
             </a:fld>
             <a:endParaRPr lang="en-CA"/>
           </a:p>
@@ -3510,7 +3510,7 @@
           <a:p>
             <a:fld id="{BB5B521A-FEE1-4C8F-9E4D-DF2ED1D6ACDC}" type="datetimeFigureOut">
               <a:rPr lang="en-CA" smtClean="0"/>
-              <a:t>2025-08-13</a:t>
+              <a:t>2025-08-18</a:t>
             </a:fld>
             <a:endParaRPr lang="en-CA"/>
           </a:p>
@@ -3825,7 +3825,7 @@
           <a:p>
             <a:fld id="{BB5B521A-FEE1-4C8F-9E4D-DF2ED1D6ACDC}" type="datetimeFigureOut">
               <a:rPr lang="en-CA" smtClean="0"/>
-              <a:t>2025-08-13</a:t>
+              <a:t>2025-08-18</a:t>
             </a:fld>
             <a:endParaRPr lang="en-CA"/>
           </a:p>
@@ -4077,7 +4077,7 @@
           <a:p>
             <a:fld id="{BB5B521A-FEE1-4C8F-9E4D-DF2ED1D6ACDC}" type="datetimeFigureOut">
               <a:rPr lang="en-CA" smtClean="0"/>
-              <a:t>2025-08-13</a:t>
+              <a:t>2025-08-18</a:t>
             </a:fld>
             <a:endParaRPr lang="en-CA"/>
           </a:p>
@@ -5256,12 +5256,12 @@
         <p:spPr>
           <a:xfrm>
             <a:off x="634632" y="4841830"/>
-            <a:ext cx="5015139" cy="1686789"/>
+            <a:ext cx="5015139" cy="1903099"/>
           </a:xfrm>
         </p:spPr>
         <p:txBody>
           <a:bodyPr>
-            <a:normAutofit/>
+            <a:normAutofit fontScale="92500" lnSpcReduction="10000"/>
           </a:bodyPr>
           <a:lstStyle/>
           <a:p>
@@ -5290,6 +5290,12 @@
             <a:r>
               <a:rPr lang="en-CA" sz="1400" dirty="0"/>
               <a:t>These tags includes game category, theme and possible game mechanics. </a:t>
+            </a:r>
+          </a:p>
+          <a:p>
+            <a:r>
+              <a:rPr lang="en-CA" sz="1400" dirty="0"/>
+              <a:t>This model explain 39.8% of the variance of game rating and 48.9% of the variance of game ownership. </a:t>
             </a:r>
           </a:p>
           <a:p>
@@ -5323,7 +5329,7 @@
         <p:spPr>
           <a:xfrm>
             <a:off x="5870548" y="4800738"/>
-            <a:ext cx="5437026" cy="1748427"/>
+            <a:ext cx="5437026" cy="1944191"/>
           </a:xfrm>
           <a:prstGeom prst="rect">
             <a:avLst/>
@@ -5331,7 +5337,7 @@
         </p:spPr>
         <p:txBody>
           <a:bodyPr vert="horz" lIns="91440" tIns="45720" rIns="91440" bIns="45720" rtlCol="0">
-            <a:normAutofit fontScale="70000" lnSpcReduction="20000"/>
+            <a:normAutofit/>
           </a:bodyPr>
           <a:lstStyle>
             <a:lvl1pPr marL="182880" indent="-182880" algn="l" defTabSz="914400" rtl="0" eaLnBrk="1" latinLnBrk="0" hangingPunct="1">
@@ -5581,19 +5587,19 @@
           </a:lstStyle>
           <a:p>
             <a:r>
-              <a:rPr lang="en-CA" dirty="0"/>
+              <a:rPr lang="en-CA" sz="1300" dirty="0"/>
               <a:t>To measure feature importance, SHAP values were extracted. </a:t>
             </a:r>
           </a:p>
           <a:p>
             <a:r>
-              <a:rPr lang="en-CA" dirty="0"/>
+              <a:rPr lang="en-CA" sz="1300" dirty="0"/>
               <a:t>To show the estimated effect of each feature, I calculated the mean SHAP difference in having versus not having a given feature. </a:t>
             </a:r>
           </a:p>
           <a:p>
             <a:r>
-              <a:rPr lang="en-CA" dirty="0"/>
+              <a:rPr lang="en-CA" sz="1300" dirty="0"/>
               <a:t>Displayed here are the estimated effects of the top 10 most predictive features of game rating and popularity, ordered by estimated overall importance [mean(|SHAP value|)].</a:t>
             </a:r>
           </a:p>

</xml_diff>